<commit_message>
Update two title pages
</commit_message>
<xml_diff>
--- a/src/videos/input_groups.pptx
+++ b/src/videos/input_groups.pptx
@@ -304,7 +304,7 @@
           <a:p>
             <a:fld id="{0E7CC0F2-DA42-B046-B261-A309B05013EA}" type="datetimeFigureOut">
               <a:rPr lang="en-US" smtClean="0"/>
-              <a:t>11/17/17</a:t>
+              <a:t>12/11/17</a:t>
             </a:fld>
             <a:endParaRPr lang="en-US"/>
           </a:p>
@@ -474,7 +474,7 @@
           <a:p>
             <a:fld id="{0E7CC0F2-DA42-B046-B261-A309B05013EA}" type="datetimeFigureOut">
               <a:rPr lang="en-US" smtClean="0"/>
-              <a:t>11/17/17</a:t>
+              <a:t>12/11/17</a:t>
             </a:fld>
             <a:endParaRPr lang="en-US"/>
           </a:p>
@@ -654,7 +654,7 @@
           <a:p>
             <a:fld id="{0E7CC0F2-DA42-B046-B261-A309B05013EA}" type="datetimeFigureOut">
               <a:rPr lang="en-US" smtClean="0"/>
-              <a:t>11/17/17</a:t>
+              <a:t>12/11/17</a:t>
             </a:fld>
             <a:endParaRPr lang="en-US"/>
           </a:p>
@@ -824,7 +824,7 @@
           <a:p>
             <a:fld id="{0E7CC0F2-DA42-B046-B261-A309B05013EA}" type="datetimeFigureOut">
               <a:rPr lang="en-US" smtClean="0"/>
-              <a:t>11/17/17</a:t>
+              <a:t>12/11/17</a:t>
             </a:fld>
             <a:endParaRPr lang="en-US"/>
           </a:p>
@@ -1070,7 +1070,7 @@
           <a:p>
             <a:fld id="{0E7CC0F2-DA42-B046-B261-A309B05013EA}" type="datetimeFigureOut">
               <a:rPr lang="en-US" smtClean="0"/>
-              <a:t>11/17/17</a:t>
+              <a:t>12/11/17</a:t>
             </a:fld>
             <a:endParaRPr lang="en-US"/>
           </a:p>
@@ -1358,7 +1358,7 @@
           <a:p>
             <a:fld id="{0E7CC0F2-DA42-B046-B261-A309B05013EA}" type="datetimeFigureOut">
               <a:rPr lang="en-US" smtClean="0"/>
-              <a:t>11/17/17</a:t>
+              <a:t>12/11/17</a:t>
             </a:fld>
             <a:endParaRPr lang="en-US"/>
           </a:p>
@@ -1785,7 +1785,7 @@
           <a:p>
             <a:fld id="{0E7CC0F2-DA42-B046-B261-A309B05013EA}" type="datetimeFigureOut">
               <a:rPr lang="en-US" smtClean="0"/>
-              <a:t>11/17/17</a:t>
+              <a:t>12/11/17</a:t>
             </a:fld>
             <a:endParaRPr lang="en-US"/>
           </a:p>
@@ -1903,7 +1903,7 @@
           <a:p>
             <a:fld id="{0E7CC0F2-DA42-B046-B261-A309B05013EA}" type="datetimeFigureOut">
               <a:rPr lang="en-US" smtClean="0"/>
-              <a:t>11/17/17</a:t>
+              <a:t>12/11/17</a:t>
             </a:fld>
             <a:endParaRPr lang="en-US"/>
           </a:p>
@@ -1998,7 +1998,7 @@
           <a:p>
             <a:fld id="{0E7CC0F2-DA42-B046-B261-A309B05013EA}" type="datetimeFigureOut">
               <a:rPr lang="en-US" smtClean="0"/>
-              <a:t>11/17/17</a:t>
+              <a:t>12/11/17</a:t>
             </a:fld>
             <a:endParaRPr lang="en-US"/>
           </a:p>
@@ -2275,7 +2275,7 @@
           <a:p>
             <a:fld id="{0E7CC0F2-DA42-B046-B261-A309B05013EA}" type="datetimeFigureOut">
               <a:rPr lang="en-US" smtClean="0"/>
-              <a:t>11/17/17</a:t>
+              <a:t>12/11/17</a:t>
             </a:fld>
             <a:endParaRPr lang="en-US"/>
           </a:p>
@@ -2528,7 +2528,7 @@
           <a:p>
             <a:fld id="{0E7CC0F2-DA42-B046-B261-A309B05013EA}" type="datetimeFigureOut">
               <a:rPr lang="en-US" smtClean="0"/>
-              <a:t>11/17/17</a:t>
+              <a:t>12/11/17</a:t>
             </a:fld>
             <a:endParaRPr lang="en-US"/>
           </a:p>
@@ -2741,7 +2741,7 @@
           <a:p>
             <a:fld id="{0E7CC0F2-DA42-B046-B261-A309B05013EA}" type="datetimeFigureOut">
               <a:rPr lang="en-US" smtClean="0"/>
-              <a:t>11/17/17</a:t>
+              <a:t>12/11/17</a:t>
             </a:fld>
             <a:endParaRPr lang="en-US"/>
           </a:p>
@@ -3432,22 +3432,25 @@
               </a:spcBef>
             </a:pPr>
             <a:r>
-              <a:rPr lang="en-US" sz="4800" dirty="0" smtClean="0">
+              <a:rPr lang="en-US" sz="4400" dirty="0" smtClean="0">
                 <a:solidFill>
                   <a:schemeClr val="accent1"/>
                 </a:solidFill>
                 <a:latin typeface="Source Sans Pro Light"/>
                 <a:cs typeface="Source Sans Pro Light"/>
               </a:rPr>
-              <a:t>Input Groups</a:t>
-            </a:r>
-            <a:endParaRPr lang="en-US" sz="4800" dirty="0" smtClean="0">
-              <a:solidFill>
-                <a:schemeClr val="accent1"/>
-              </a:solidFill>
-              <a:latin typeface="Source Sans Pro Light"/>
-              <a:cs typeface="Source Sans Pro Light"/>
-            </a:endParaRPr>
+              <a:t>Input </a:t>
+            </a:r>
+            <a:r>
+              <a:rPr lang="en-US" sz="4400" dirty="0" smtClean="0">
+                <a:solidFill>
+                  <a:schemeClr val="accent1"/>
+                </a:solidFill>
+                <a:latin typeface="Source Sans Pro Light"/>
+                <a:cs typeface="Source Sans Pro Light"/>
+              </a:rPr>
+              <a:t>Groups</a:t>
+            </a:r>
           </a:p>
           <a:p>
             <a:pPr algn="l">
@@ -3456,7 +3459,7 @@
               </a:spcBef>
             </a:pPr>
             <a:r>
-              <a:rPr lang="en-US" sz="2800" dirty="0" smtClean="0">
+              <a:rPr lang="en-US" sz="2400" dirty="0" smtClean="0">
                 <a:solidFill>
                   <a:schemeClr val="accent1"/>
                 </a:solidFill>
@@ -3466,7 +3469,7 @@
               <a:t>SoS variables </a:t>
             </a:r>
             <a:r>
-              <a:rPr lang="en-US" sz="2800" dirty="0" smtClean="0">
+              <a:rPr lang="en-US" sz="2400" dirty="0" err="1" smtClean="0">
                 <a:solidFill>
                   <a:schemeClr val="accent1"/>
                 </a:solidFill>
@@ -3474,20 +3477,30 @@
                 <a:ea typeface="Consolas" charset="0"/>
                 <a:cs typeface="Consolas" charset="0"/>
               </a:rPr>
-              <a:t>input</a:t>
-            </a:r>
-            <a:r>
-              <a:rPr lang="en-US" sz="2800" dirty="0" smtClean="0">
+              <a:t>sos_input</a:t>
+            </a:r>
+            <a:r>
+              <a:rPr lang="en-US" sz="2400" dirty="0">
                 <a:solidFill>
                   <a:schemeClr val="accent1"/>
                 </a:solidFill>
                 <a:latin typeface="Source Sans Pro Light"/>
                 <a:cs typeface="Source Sans Pro Light"/>
               </a:rPr>
-              <a:t> and </a:t>
-            </a:r>
-            <a:r>
-              <a:rPr lang="en-US" sz="2800" dirty="0" smtClean="0">
+              <a:t> </a:t>
+            </a:r>
+            <a:r>
+              <a:rPr lang="en-US" sz="2400" dirty="0" smtClean="0">
+                <a:solidFill>
+                  <a:schemeClr val="accent1"/>
+                </a:solidFill>
+                <a:latin typeface="Source Sans Pro Light"/>
+                <a:cs typeface="Source Sans Pro Light"/>
+              </a:rPr>
+              <a:t>and </a:t>
+            </a:r>
+            <a:r>
+              <a:rPr lang="en-US" sz="2400" dirty="0" smtClean="0">
                 <a:solidFill>
                   <a:schemeClr val="accent1"/>
                 </a:solidFill>
@@ -3497,7 +3510,7 @@
               </a:rPr>
               <a:t>_input</a:t>
             </a:r>
-            <a:endParaRPr lang="en-US" sz="2800" dirty="0" smtClean="0">
+            <a:endParaRPr lang="en-US" sz="2400" dirty="0" smtClean="0">
               <a:solidFill>
                 <a:schemeClr val="accent1"/>
               </a:solidFill>

</xml_diff>